<commit_message>
- Atualização dos projetos e slides sobre design patterns
</commit_message>
<xml_diff>
--- a/slides/jdbc.pptx
+++ b/slides/jdbc.pptx
@@ -16444,6 +16444,16 @@
           <a:lstStyle/>
           <a:p>
             <a:r>
+              <a:rPr lang="pt-BR" sz="1200" dirty="0">
+                <a:solidFill>
+                  <a:schemeClr val="bg1"/>
+                </a:solidFill>
+                <a:latin typeface="Verdana" panose="020B0604030504040204" pitchFamily="34" charset="0"/>
+                <a:ea typeface="Verdana" panose="020B0604030504040204" pitchFamily="34" charset="0"/>
+              </a:rPr>
+              <a:t>        </a:t>
+            </a:r>
+            <a:r>
               <a:rPr lang="pt-BR" sz="1200" dirty="0" err="1">
                 <a:solidFill>
                   <a:schemeClr val="bg1"/>

</xml_diff>